<commit_message>
Systran Translate API has fallen into disrepair and no longer functions.  Replaced Systran Translate API with MicrosoftAzure Text Translate API.
</commit_message>
<xml_diff>
--- a/assets/images/euro-ppt.pptx
+++ b/assets/images/euro-ppt.pptx
@@ -7070,13 +7070,8 @@
           <a:p>
             <a:r>
               <a:rPr lang="en-US" dirty="0"/>
-              <a:t>Mobile </a:t>
-            </a:r>
-            <a:r>
-              <a:rPr lang="en-US" dirty="0" err="1"/>
-              <a:t>Responsivesness</a:t>
-            </a:r>
-            <a:endParaRPr lang="en-US" dirty="0"/>
+              <a:t>Mobile Responsivesness</a:t>
+            </a:r>
           </a:p>
           <a:p>
             <a:pPr lvl="1"/>

</xml_diff>